<commit_message>
add dma stream, channel concept and adc p2m example
</commit_message>
<xml_diff>
--- a/doc/dma_path.pptx
+++ b/doc/dma_path.pptx
@@ -7,6 +7,7 @@
   <p:sldIdLst>
     <p:sldId id="256" r:id="rId2"/>
     <p:sldId id="257" r:id="rId3"/>
+    <p:sldId id="258" r:id="rId4"/>
   </p:sldIdLst>
   <p:sldSz cx="12192000" cy="6858000"/>
   <p:notesSz cx="6858000" cy="9144000"/>
@@ -105,6 +106,11 @@
       </a:defRPr>
     </a:lvl9pPr>
   </p:defaultTextStyle>
+  <p:extLst>
+    <p:ext uri="{EFAFB233-063F-42B5-8137-9DF3F51BA10A}">
+      <p15:sldGuideLst xmlns:p15="http://schemas.microsoft.com/office/powerpoint/2012/main"/>
+    </p:ext>
+  </p:extLst>
 </p:presentation>
 </file>
 
@@ -255,7 +261,7 @@
           <a:p>
             <a:fld id="{53684CAB-BA9E-446F-B209-5851F9C710C8}" type="datetimeFigureOut">
               <a:rPr lang="ko-KR" altLang="en-US" smtClean="0"/>
-              <a:t>2020-08-26</a:t>
+              <a:t>2020-09-09</a:t>
             </a:fld>
             <a:endParaRPr lang="ko-KR" altLang="en-US"/>
           </a:p>
@@ -453,7 +459,7 @@
           <a:p>
             <a:fld id="{53684CAB-BA9E-446F-B209-5851F9C710C8}" type="datetimeFigureOut">
               <a:rPr lang="ko-KR" altLang="en-US" smtClean="0"/>
-              <a:t>2020-08-26</a:t>
+              <a:t>2020-09-09</a:t>
             </a:fld>
             <a:endParaRPr lang="ko-KR" altLang="en-US"/>
           </a:p>
@@ -661,7 +667,7 @@
           <a:p>
             <a:fld id="{53684CAB-BA9E-446F-B209-5851F9C710C8}" type="datetimeFigureOut">
               <a:rPr lang="ko-KR" altLang="en-US" smtClean="0"/>
-              <a:t>2020-08-26</a:t>
+              <a:t>2020-09-09</a:t>
             </a:fld>
             <a:endParaRPr lang="ko-KR" altLang="en-US"/>
           </a:p>
@@ -859,7 +865,7 @@
           <a:p>
             <a:fld id="{53684CAB-BA9E-446F-B209-5851F9C710C8}" type="datetimeFigureOut">
               <a:rPr lang="ko-KR" altLang="en-US" smtClean="0"/>
-              <a:t>2020-08-26</a:t>
+              <a:t>2020-09-09</a:t>
             </a:fld>
             <a:endParaRPr lang="ko-KR" altLang="en-US"/>
           </a:p>
@@ -1134,7 +1140,7 @@
           <a:p>
             <a:fld id="{53684CAB-BA9E-446F-B209-5851F9C710C8}" type="datetimeFigureOut">
               <a:rPr lang="ko-KR" altLang="en-US" smtClean="0"/>
-              <a:t>2020-08-26</a:t>
+              <a:t>2020-09-09</a:t>
             </a:fld>
             <a:endParaRPr lang="ko-KR" altLang="en-US"/>
           </a:p>
@@ -1399,7 +1405,7 @@
           <a:p>
             <a:fld id="{53684CAB-BA9E-446F-B209-5851F9C710C8}" type="datetimeFigureOut">
               <a:rPr lang="ko-KR" altLang="en-US" smtClean="0"/>
-              <a:t>2020-08-26</a:t>
+              <a:t>2020-09-09</a:t>
             </a:fld>
             <a:endParaRPr lang="ko-KR" altLang="en-US"/>
           </a:p>
@@ -1811,7 +1817,7 @@
           <a:p>
             <a:fld id="{53684CAB-BA9E-446F-B209-5851F9C710C8}" type="datetimeFigureOut">
               <a:rPr lang="ko-KR" altLang="en-US" smtClean="0"/>
-              <a:t>2020-08-26</a:t>
+              <a:t>2020-09-09</a:t>
             </a:fld>
             <a:endParaRPr lang="ko-KR" altLang="en-US"/>
           </a:p>
@@ -1952,7 +1958,7 @@
           <a:p>
             <a:fld id="{53684CAB-BA9E-446F-B209-5851F9C710C8}" type="datetimeFigureOut">
               <a:rPr lang="ko-KR" altLang="en-US" smtClean="0"/>
-              <a:t>2020-08-26</a:t>
+              <a:t>2020-09-09</a:t>
             </a:fld>
             <a:endParaRPr lang="ko-KR" altLang="en-US"/>
           </a:p>
@@ -2065,7 +2071,7 @@
           <a:p>
             <a:fld id="{53684CAB-BA9E-446F-B209-5851F9C710C8}" type="datetimeFigureOut">
               <a:rPr lang="ko-KR" altLang="en-US" smtClean="0"/>
-              <a:t>2020-08-26</a:t>
+              <a:t>2020-09-09</a:t>
             </a:fld>
             <a:endParaRPr lang="ko-KR" altLang="en-US"/>
           </a:p>
@@ -2376,7 +2382,7 @@
           <a:p>
             <a:fld id="{53684CAB-BA9E-446F-B209-5851F9C710C8}" type="datetimeFigureOut">
               <a:rPr lang="ko-KR" altLang="en-US" smtClean="0"/>
-              <a:t>2020-08-26</a:t>
+              <a:t>2020-09-09</a:t>
             </a:fld>
             <a:endParaRPr lang="ko-KR" altLang="en-US"/>
           </a:p>
@@ -2664,7 +2670,7 @@
           <a:p>
             <a:fld id="{53684CAB-BA9E-446F-B209-5851F9C710C8}" type="datetimeFigureOut">
               <a:rPr lang="ko-KR" altLang="en-US" smtClean="0"/>
-              <a:t>2020-08-26</a:t>
+              <a:t>2020-09-09</a:t>
             </a:fld>
             <a:endParaRPr lang="ko-KR" altLang="en-US"/>
           </a:p>
@@ -2905,7 +2911,7 @@
           <a:p>
             <a:fld id="{53684CAB-BA9E-446F-B209-5851F9C710C8}" type="datetimeFigureOut">
               <a:rPr lang="ko-KR" altLang="en-US" smtClean="0"/>
-              <a:t>2020-08-26</a:t>
+              <a:t>2020-09-09</a:t>
             </a:fld>
             <a:endParaRPr lang="ko-KR" altLang="en-US"/>
           </a:p>
@@ -4659,6 +4665,897 @@
 </p:sld>
 </file>
 
+<file path=ppt/slides/slide3.xml><?xml version="1.0" encoding="utf-8"?>
+<p:sld xmlns:a="http://schemas.openxmlformats.org/drawingml/2006/main" xmlns:r="http://schemas.openxmlformats.org/officeDocument/2006/relationships" xmlns:p="http://schemas.openxmlformats.org/presentationml/2006/main">
+  <p:cSld>
+    <p:spTree>
+      <p:nvGrpSpPr>
+        <p:cNvPr id="1" name=""/>
+        <p:cNvGrpSpPr/>
+        <p:nvPr/>
+      </p:nvGrpSpPr>
+      <p:grpSpPr>
+        <a:xfrm>
+          <a:off x="0" y="0"/>
+          <a:ext cx="0" cy="0"/>
+          <a:chOff x="0" y="0"/>
+          <a:chExt cx="0" cy="0"/>
+        </a:xfrm>
+      </p:grpSpPr>
+      <p:sp>
+        <p:nvSpPr>
+          <p:cNvPr id="4" name="사각형: 둥근 모서리 3">
+            <a:extLst>
+              <a:ext uri="{FF2B5EF4-FFF2-40B4-BE49-F238E27FC236}">
+                <a16:creationId xmlns:a16="http://schemas.microsoft.com/office/drawing/2014/main" id="{DDA522DF-D5A0-4597-A8D3-B4D877B4A6E5}"/>
+              </a:ext>
+            </a:extLst>
+          </p:cNvPr>
+          <p:cNvSpPr/>
+          <p:nvPr/>
+        </p:nvSpPr>
+        <p:spPr>
+          <a:xfrm>
+            <a:off x="901336" y="4320209"/>
+            <a:ext cx="1732537" cy="1417982"/>
+          </a:xfrm>
+          <a:prstGeom prst="roundRect">
+            <a:avLst/>
+          </a:prstGeom>
+          <a:noFill/>
+          <a:ln>
+            <a:solidFill>
+              <a:schemeClr val="tx1"/>
+            </a:solidFill>
+          </a:ln>
+        </p:spPr>
+        <p:style>
+          <a:lnRef idx="2">
+            <a:schemeClr val="accent1">
+              <a:shade val="50000"/>
+            </a:schemeClr>
+          </a:lnRef>
+          <a:fillRef idx="1">
+            <a:schemeClr val="accent1"/>
+          </a:fillRef>
+          <a:effectRef idx="0">
+            <a:schemeClr val="accent1"/>
+          </a:effectRef>
+          <a:fontRef idx="minor">
+            <a:schemeClr val="lt1"/>
+          </a:fontRef>
+        </p:style>
+        <p:txBody>
+          <a:bodyPr rtlCol="0" anchor="ctr"/>
+          <a:lstStyle/>
+          <a:p>
+            <a:pPr algn="ctr"/>
+            <a:r>
+              <a:rPr lang="en-US" altLang="ko-KR" sz="2400" dirty="0">
+                <a:solidFill>
+                  <a:schemeClr val="accent4">
+                    <a:lumMod val="50000"/>
+                  </a:schemeClr>
+                </a:solidFill>
+                <a:latin typeface="배달의민족 한나는 열한살" panose="020B0600000101010101" pitchFamily="50" charset="-127"/>
+                <a:ea typeface="배달의민족 한나는 열한살" panose="020B0600000101010101" pitchFamily="50" charset="-127"/>
+              </a:rPr>
+              <a:t>ADC</a:t>
+            </a:r>
+            <a:endParaRPr lang="ko-KR" altLang="en-US" sz="2400" dirty="0">
+              <a:solidFill>
+                <a:schemeClr val="accent4">
+                  <a:lumMod val="50000"/>
+                </a:schemeClr>
+              </a:solidFill>
+              <a:latin typeface="배달의민족 한나는 열한살" panose="020B0600000101010101" pitchFamily="50" charset="-127"/>
+              <a:ea typeface="배달의민족 한나는 열한살" panose="020B0600000101010101" pitchFamily="50" charset="-127"/>
+            </a:endParaRPr>
+          </a:p>
+        </p:txBody>
+      </p:sp>
+      <p:sp>
+        <p:nvSpPr>
+          <p:cNvPr id="5" name="사각형: 둥근 모서리 4">
+            <a:extLst>
+              <a:ext uri="{FF2B5EF4-FFF2-40B4-BE49-F238E27FC236}">
+                <a16:creationId xmlns:a16="http://schemas.microsoft.com/office/drawing/2014/main" id="{ADCEB4FF-E2A0-4582-9891-8CE7BE0CA26B}"/>
+              </a:ext>
+            </a:extLst>
+          </p:cNvPr>
+          <p:cNvSpPr/>
+          <p:nvPr/>
+        </p:nvSpPr>
+        <p:spPr>
+          <a:xfrm>
+            <a:off x="4706718" y="4316612"/>
+            <a:ext cx="2173357" cy="1417982"/>
+          </a:xfrm>
+          <a:prstGeom prst="roundRect">
+            <a:avLst/>
+          </a:prstGeom>
+          <a:noFill/>
+          <a:ln>
+            <a:solidFill>
+              <a:schemeClr val="tx1"/>
+            </a:solidFill>
+          </a:ln>
+        </p:spPr>
+        <p:style>
+          <a:lnRef idx="2">
+            <a:schemeClr val="accent1">
+              <a:shade val="50000"/>
+            </a:schemeClr>
+          </a:lnRef>
+          <a:fillRef idx="1">
+            <a:schemeClr val="accent1"/>
+          </a:fillRef>
+          <a:effectRef idx="0">
+            <a:schemeClr val="accent1"/>
+          </a:effectRef>
+          <a:fontRef idx="minor">
+            <a:schemeClr val="lt1"/>
+          </a:fontRef>
+        </p:style>
+        <p:txBody>
+          <a:bodyPr rtlCol="0" anchor="ctr"/>
+          <a:lstStyle/>
+          <a:p>
+            <a:pPr algn="ctr"/>
+            <a:r>
+              <a:rPr lang="en-US" altLang="ko-KR" sz="2400" dirty="0">
+                <a:solidFill>
+                  <a:schemeClr val="accent4">
+                    <a:lumMod val="50000"/>
+                  </a:schemeClr>
+                </a:solidFill>
+                <a:latin typeface="배달의민족 한나는 열한살" panose="020B0600000101010101" pitchFamily="50" charset="-127"/>
+                <a:ea typeface="배달의민족 한나는 열한살" panose="020B0600000101010101" pitchFamily="50" charset="-127"/>
+              </a:rPr>
+              <a:t>ARM</a:t>
+            </a:r>
+            <a:endParaRPr lang="ko-KR" altLang="en-US" sz="2400" dirty="0">
+              <a:solidFill>
+                <a:schemeClr val="accent4">
+                  <a:lumMod val="50000"/>
+                </a:schemeClr>
+              </a:solidFill>
+              <a:latin typeface="배달의민족 한나는 열한살" panose="020B0600000101010101" pitchFamily="50" charset="-127"/>
+              <a:ea typeface="배달의민족 한나는 열한살" panose="020B0600000101010101" pitchFamily="50" charset="-127"/>
+            </a:endParaRPr>
+          </a:p>
+        </p:txBody>
+      </p:sp>
+      <p:sp>
+        <p:nvSpPr>
+          <p:cNvPr id="6" name="사각형: 둥근 모서리 5">
+            <a:extLst>
+              <a:ext uri="{FF2B5EF4-FFF2-40B4-BE49-F238E27FC236}">
+                <a16:creationId xmlns:a16="http://schemas.microsoft.com/office/drawing/2014/main" id="{5D9E0094-65EC-4892-BF37-3FBA1EB30119}"/>
+              </a:ext>
+            </a:extLst>
+          </p:cNvPr>
+          <p:cNvSpPr/>
+          <p:nvPr/>
+        </p:nvSpPr>
+        <p:spPr>
+          <a:xfrm>
+            <a:off x="901501" y="2909628"/>
+            <a:ext cx="1732207" cy="827989"/>
+          </a:xfrm>
+          <a:prstGeom prst="roundRect">
+            <a:avLst/>
+          </a:prstGeom>
+          <a:noFill/>
+          <a:ln w="28575">
+            <a:solidFill>
+              <a:schemeClr val="tx1"/>
+            </a:solidFill>
+          </a:ln>
+        </p:spPr>
+        <p:style>
+          <a:lnRef idx="2">
+            <a:schemeClr val="accent1">
+              <a:shade val="50000"/>
+            </a:schemeClr>
+          </a:lnRef>
+          <a:fillRef idx="1">
+            <a:schemeClr val="accent1"/>
+          </a:fillRef>
+          <a:effectRef idx="0">
+            <a:schemeClr val="accent1"/>
+          </a:effectRef>
+          <a:fontRef idx="minor">
+            <a:schemeClr val="lt1"/>
+          </a:fontRef>
+        </p:style>
+        <p:txBody>
+          <a:bodyPr rtlCol="0" anchor="ctr"/>
+          <a:lstStyle/>
+          <a:p>
+            <a:pPr algn="ctr"/>
+            <a:r>
+              <a:rPr lang="en-US" altLang="ko-KR" dirty="0">
+                <a:solidFill>
+                  <a:schemeClr val="accent4">
+                    <a:lumMod val="50000"/>
+                  </a:schemeClr>
+                </a:solidFill>
+                <a:latin typeface="배달의민족 한나는 열한살" panose="020B0600000101010101" pitchFamily="50" charset="-127"/>
+                <a:ea typeface="배달의민족 한나는 열한살" panose="020B0600000101010101" pitchFamily="50" charset="-127"/>
+              </a:rPr>
+              <a:t>DR</a:t>
+            </a:r>
+            <a:endParaRPr lang="ko-KR" altLang="en-US" sz="1800" dirty="0">
+              <a:solidFill>
+                <a:schemeClr val="accent4">
+                  <a:lumMod val="50000"/>
+                </a:schemeClr>
+              </a:solidFill>
+              <a:latin typeface="배달의민족 한나는 열한살" panose="020B0600000101010101" pitchFamily="50" charset="-127"/>
+              <a:ea typeface="배달의민족 한나는 열한살" panose="020B0600000101010101" pitchFamily="50" charset="-127"/>
+            </a:endParaRPr>
+          </a:p>
+        </p:txBody>
+      </p:sp>
+      <p:sp>
+        <p:nvSpPr>
+          <p:cNvPr id="7" name="사각형: 둥근 모서리 6">
+            <a:extLst>
+              <a:ext uri="{FF2B5EF4-FFF2-40B4-BE49-F238E27FC236}">
+                <a16:creationId xmlns:a16="http://schemas.microsoft.com/office/drawing/2014/main" id="{CC7996DA-7D54-407E-8692-C607BE89AD13}"/>
+              </a:ext>
+            </a:extLst>
+          </p:cNvPr>
+          <p:cNvSpPr/>
+          <p:nvPr/>
+        </p:nvSpPr>
+        <p:spPr>
+          <a:xfrm>
+            <a:off x="7390254" y="2614632"/>
+            <a:ext cx="2173357" cy="1417982"/>
+          </a:xfrm>
+          <a:prstGeom prst="roundRect">
+            <a:avLst/>
+          </a:prstGeom>
+          <a:noFill/>
+          <a:ln>
+            <a:solidFill>
+              <a:schemeClr val="tx1"/>
+            </a:solidFill>
+          </a:ln>
+        </p:spPr>
+        <p:style>
+          <a:lnRef idx="2">
+            <a:schemeClr val="accent1">
+              <a:shade val="50000"/>
+            </a:schemeClr>
+          </a:lnRef>
+          <a:fillRef idx="1">
+            <a:schemeClr val="accent1"/>
+          </a:fillRef>
+          <a:effectRef idx="0">
+            <a:schemeClr val="accent1"/>
+          </a:effectRef>
+          <a:fontRef idx="minor">
+            <a:schemeClr val="lt1"/>
+          </a:fontRef>
+        </p:style>
+        <p:txBody>
+          <a:bodyPr rtlCol="0" anchor="ctr"/>
+          <a:lstStyle/>
+          <a:p>
+            <a:pPr algn="ctr"/>
+            <a:r>
+              <a:rPr lang="en-US" altLang="ko-KR" dirty="0">
+                <a:solidFill>
+                  <a:schemeClr val="accent4">
+                    <a:lumMod val="50000"/>
+                  </a:schemeClr>
+                </a:solidFill>
+                <a:latin typeface="배달의민족 한나는 열한살" panose="020B0600000101010101" pitchFamily="50" charset="-127"/>
+                <a:ea typeface="배달의민족 한나는 열한살" panose="020B0600000101010101" pitchFamily="50" charset="-127"/>
+              </a:rPr>
+              <a:t>DMA1/DMA2</a:t>
+            </a:r>
+            <a:endParaRPr lang="ko-KR" altLang="en-US" sz="1800" dirty="0">
+              <a:solidFill>
+                <a:schemeClr val="accent4">
+                  <a:lumMod val="50000"/>
+                </a:schemeClr>
+              </a:solidFill>
+              <a:latin typeface="배달의민족 한나는 열한살" panose="020B0600000101010101" pitchFamily="50" charset="-127"/>
+              <a:ea typeface="배달의민족 한나는 열한살" panose="020B0600000101010101" pitchFamily="50" charset="-127"/>
+            </a:endParaRPr>
+          </a:p>
+        </p:txBody>
+      </p:sp>
+      <p:sp>
+        <p:nvSpPr>
+          <p:cNvPr id="8" name="사각형: 둥근 모서리 7">
+            <a:extLst>
+              <a:ext uri="{FF2B5EF4-FFF2-40B4-BE49-F238E27FC236}">
+                <a16:creationId xmlns:a16="http://schemas.microsoft.com/office/drawing/2014/main" id="{9A9B812C-48C3-454E-8C97-BC94FAC43941}"/>
+              </a:ext>
+            </a:extLst>
+          </p:cNvPr>
+          <p:cNvSpPr/>
+          <p:nvPr/>
+        </p:nvSpPr>
+        <p:spPr>
+          <a:xfrm>
+            <a:off x="7390252" y="539725"/>
+            <a:ext cx="2173358" cy="1233754"/>
+          </a:xfrm>
+          <a:prstGeom prst="roundRect">
+            <a:avLst/>
+          </a:prstGeom>
+          <a:noFill/>
+          <a:ln>
+            <a:solidFill>
+              <a:schemeClr val="tx1"/>
+            </a:solidFill>
+          </a:ln>
+        </p:spPr>
+        <p:style>
+          <a:lnRef idx="2">
+            <a:schemeClr val="accent1">
+              <a:shade val="50000"/>
+            </a:schemeClr>
+          </a:lnRef>
+          <a:fillRef idx="1">
+            <a:schemeClr val="accent1"/>
+          </a:fillRef>
+          <a:effectRef idx="0">
+            <a:schemeClr val="accent1"/>
+          </a:effectRef>
+          <a:fontRef idx="minor">
+            <a:schemeClr val="lt1"/>
+          </a:fontRef>
+        </p:style>
+        <p:txBody>
+          <a:bodyPr rtlCol="0" anchor="ctr"/>
+          <a:lstStyle/>
+          <a:p>
+            <a:pPr algn="ctr"/>
+            <a:r>
+              <a:rPr lang="en-US" altLang="ko-KR" sz="1800" dirty="0">
+                <a:solidFill>
+                  <a:schemeClr val="accent4">
+                    <a:lumMod val="50000"/>
+                  </a:schemeClr>
+                </a:solidFill>
+                <a:latin typeface="배달의민족 한나는 열한살" panose="020B0600000101010101" pitchFamily="50" charset="-127"/>
+                <a:ea typeface="배달의민족 한나는 열한살" panose="020B0600000101010101" pitchFamily="50" charset="-127"/>
+              </a:rPr>
+              <a:t>SRAM1</a:t>
+            </a:r>
+            <a:endParaRPr lang="ko-KR" altLang="en-US" sz="1800" dirty="0">
+              <a:solidFill>
+                <a:schemeClr val="accent4">
+                  <a:lumMod val="50000"/>
+                </a:schemeClr>
+              </a:solidFill>
+              <a:latin typeface="배달의민족 한나는 열한살" panose="020B0600000101010101" pitchFamily="50" charset="-127"/>
+              <a:ea typeface="배달의민족 한나는 열한살" panose="020B0600000101010101" pitchFamily="50" charset="-127"/>
+            </a:endParaRPr>
+          </a:p>
+        </p:txBody>
+      </p:sp>
+      <p:cxnSp>
+        <p:nvCxnSpPr>
+          <p:cNvPr id="16" name="연결선: 꺾임 15">
+            <a:extLst>
+              <a:ext uri="{FF2B5EF4-FFF2-40B4-BE49-F238E27FC236}">
+                <a16:creationId xmlns:a16="http://schemas.microsoft.com/office/drawing/2014/main" id="{EFA917FC-70F5-4822-9FE6-96E9F6AAD3D6}"/>
+              </a:ext>
+            </a:extLst>
+          </p:cNvPr>
+          <p:cNvCxnSpPr>
+            <a:stCxn id="5" idx="3"/>
+            <a:endCxn id="7" idx="2"/>
+          </p:cNvCxnSpPr>
+          <p:nvPr/>
+        </p:nvCxnSpPr>
+        <p:spPr>
+          <a:xfrm flipV="1">
+            <a:off x="6880075" y="4032614"/>
+            <a:ext cx="1596858" cy="992989"/>
+          </a:xfrm>
+          <a:prstGeom prst="bentConnector2">
+            <a:avLst/>
+          </a:prstGeom>
+          <a:ln>
+            <a:tailEnd type="triangle"/>
+          </a:ln>
+        </p:spPr>
+        <p:style>
+          <a:lnRef idx="1">
+            <a:schemeClr val="accent1"/>
+          </a:lnRef>
+          <a:fillRef idx="0">
+            <a:schemeClr val="accent1"/>
+          </a:fillRef>
+          <a:effectRef idx="0">
+            <a:schemeClr val="accent1"/>
+          </a:effectRef>
+          <a:fontRef idx="minor">
+            <a:schemeClr val="tx1"/>
+          </a:fontRef>
+        </p:style>
+      </p:cxnSp>
+      <p:sp>
+        <p:nvSpPr>
+          <p:cNvPr id="17" name="TextBox 16">
+            <a:extLst>
+              <a:ext uri="{FF2B5EF4-FFF2-40B4-BE49-F238E27FC236}">
+                <a16:creationId xmlns:a16="http://schemas.microsoft.com/office/drawing/2014/main" id="{AF9E3FF9-72EC-4ECB-B6BA-4F9D78D4BF02}"/>
+              </a:ext>
+            </a:extLst>
+          </p:cNvPr>
+          <p:cNvSpPr txBox="1"/>
+          <p:nvPr/>
+        </p:nvSpPr>
+        <p:spPr>
+          <a:xfrm>
+            <a:off x="5640185" y="2971800"/>
+            <a:ext cx="65" cy="276999"/>
+          </a:xfrm>
+          <a:prstGeom prst="rect">
+            <a:avLst/>
+          </a:prstGeom>
+          <a:noFill/>
+        </p:spPr>
+        <p:txBody>
+          <a:bodyPr wrap="none" lIns="0" tIns="0" rIns="0" bIns="0" rtlCol="0">
+            <a:spAutoFit/>
+          </a:bodyPr>
+          <a:lstStyle/>
+          <a:p>
+            <a:endParaRPr lang="ko-KR" altLang="en-US" dirty="0"/>
+          </a:p>
+        </p:txBody>
+      </p:sp>
+      <p:sp>
+        <p:nvSpPr>
+          <p:cNvPr id="18" name="TextBox 17">
+            <a:extLst>
+              <a:ext uri="{FF2B5EF4-FFF2-40B4-BE49-F238E27FC236}">
+                <a16:creationId xmlns:a16="http://schemas.microsoft.com/office/drawing/2014/main" id="{BA1969D0-53DF-4745-AA4A-0BADE8D0D5A6}"/>
+              </a:ext>
+            </a:extLst>
+          </p:cNvPr>
+          <p:cNvSpPr txBox="1"/>
+          <p:nvPr/>
+        </p:nvSpPr>
+        <p:spPr>
+          <a:xfrm>
+            <a:off x="1810486" y="3912991"/>
+            <a:ext cx="390087" cy="369332"/>
+          </a:xfrm>
+          <a:prstGeom prst="rect">
+            <a:avLst/>
+          </a:prstGeom>
+          <a:noFill/>
+        </p:spPr>
+        <p:txBody>
+          <a:bodyPr wrap="square" rtlCol="0">
+            <a:spAutoFit/>
+          </a:bodyPr>
+          <a:lstStyle/>
+          <a:p>
+            <a:r>
+              <a:rPr lang="en-US" altLang="ko-KR" dirty="0">
+                <a:solidFill>
+                  <a:schemeClr val="accent4">
+                    <a:lumMod val="50000"/>
+                  </a:schemeClr>
+                </a:solidFill>
+                <a:latin typeface="돋움" panose="020B0600000101010101" pitchFamily="50" charset="-127"/>
+                <a:ea typeface="돋움" panose="020B0600000101010101" pitchFamily="50" charset="-127"/>
+              </a:rPr>
+              <a:t>①</a:t>
+            </a:r>
+            <a:endParaRPr lang="ko-KR" altLang="en-US" dirty="0"/>
+          </a:p>
+        </p:txBody>
+      </p:sp>
+      <p:sp>
+        <p:nvSpPr>
+          <p:cNvPr id="19" name="TextBox 18">
+            <a:extLst>
+              <a:ext uri="{FF2B5EF4-FFF2-40B4-BE49-F238E27FC236}">
+                <a16:creationId xmlns:a16="http://schemas.microsoft.com/office/drawing/2014/main" id="{632A4FF5-2D99-4FDD-BA59-62E92F9E7A15}"/>
+              </a:ext>
+            </a:extLst>
+          </p:cNvPr>
+          <p:cNvSpPr txBox="1"/>
+          <p:nvPr/>
+        </p:nvSpPr>
+        <p:spPr>
+          <a:xfrm>
+            <a:off x="3452650" y="4559530"/>
+            <a:ext cx="390087" cy="369332"/>
+          </a:xfrm>
+          <a:prstGeom prst="rect">
+            <a:avLst/>
+          </a:prstGeom>
+          <a:noFill/>
+        </p:spPr>
+        <p:txBody>
+          <a:bodyPr wrap="square" rtlCol="0">
+            <a:spAutoFit/>
+          </a:bodyPr>
+          <a:lstStyle/>
+          <a:p>
+            <a:r>
+              <a:rPr lang="en-US" altLang="ko-KR" dirty="0">
+                <a:solidFill>
+                  <a:schemeClr val="accent4">
+                    <a:lumMod val="50000"/>
+                  </a:schemeClr>
+                </a:solidFill>
+                <a:latin typeface="돋움" panose="020B0600000101010101" pitchFamily="50" charset="-127"/>
+                <a:ea typeface="돋움" panose="020B0600000101010101" pitchFamily="50" charset="-127"/>
+              </a:rPr>
+              <a:t>②</a:t>
+            </a:r>
+            <a:endParaRPr lang="ko-KR" altLang="en-US" dirty="0"/>
+          </a:p>
+        </p:txBody>
+      </p:sp>
+      <p:sp>
+        <p:nvSpPr>
+          <p:cNvPr id="20" name="TextBox 19">
+            <a:extLst>
+              <a:ext uri="{FF2B5EF4-FFF2-40B4-BE49-F238E27FC236}">
+                <a16:creationId xmlns:a16="http://schemas.microsoft.com/office/drawing/2014/main" id="{F4E37EC1-3514-4DD1-AC76-3236090B835D}"/>
+              </a:ext>
+            </a:extLst>
+          </p:cNvPr>
+          <p:cNvSpPr txBox="1"/>
+          <p:nvPr/>
+        </p:nvSpPr>
+        <p:spPr>
+          <a:xfrm>
+            <a:off x="7483460" y="4599523"/>
+            <a:ext cx="390087" cy="369332"/>
+          </a:xfrm>
+          <a:prstGeom prst="rect">
+            <a:avLst/>
+          </a:prstGeom>
+          <a:noFill/>
+        </p:spPr>
+        <p:txBody>
+          <a:bodyPr wrap="square" rtlCol="0">
+            <a:spAutoFit/>
+          </a:bodyPr>
+          <a:lstStyle/>
+          <a:p>
+            <a:r>
+              <a:rPr lang="en-US" altLang="ko-KR" dirty="0">
+                <a:solidFill>
+                  <a:schemeClr val="accent4">
+                    <a:lumMod val="50000"/>
+                  </a:schemeClr>
+                </a:solidFill>
+                <a:latin typeface="돋움" panose="020B0600000101010101" pitchFamily="50" charset="-127"/>
+                <a:ea typeface="돋움" panose="020B0600000101010101" pitchFamily="50" charset="-127"/>
+              </a:rPr>
+              <a:t>③</a:t>
+            </a:r>
+            <a:endParaRPr lang="ko-KR" altLang="en-US" dirty="0"/>
+          </a:p>
+        </p:txBody>
+      </p:sp>
+      <p:sp>
+        <p:nvSpPr>
+          <p:cNvPr id="23" name="TextBox 22">
+            <a:extLst>
+              <a:ext uri="{FF2B5EF4-FFF2-40B4-BE49-F238E27FC236}">
+                <a16:creationId xmlns:a16="http://schemas.microsoft.com/office/drawing/2014/main" id="{5A67F53B-1459-4F6E-947B-A84240B1AC8C}"/>
+              </a:ext>
+            </a:extLst>
+          </p:cNvPr>
+          <p:cNvSpPr txBox="1"/>
+          <p:nvPr/>
+        </p:nvSpPr>
+        <p:spPr>
+          <a:xfrm>
+            <a:off x="7678503" y="2023447"/>
+            <a:ext cx="390087" cy="369332"/>
+          </a:xfrm>
+          <a:prstGeom prst="rect">
+            <a:avLst/>
+          </a:prstGeom>
+          <a:noFill/>
+        </p:spPr>
+        <p:txBody>
+          <a:bodyPr wrap="square" rtlCol="0">
+            <a:spAutoFit/>
+          </a:bodyPr>
+          <a:lstStyle/>
+          <a:p>
+            <a:r>
+              <a:rPr lang="en-US" altLang="ko-KR" dirty="0">
+                <a:solidFill>
+                  <a:schemeClr val="accent4">
+                    <a:lumMod val="50000"/>
+                  </a:schemeClr>
+                </a:solidFill>
+                <a:latin typeface="돋움" panose="020B0600000101010101" pitchFamily="50" charset="-127"/>
+                <a:ea typeface="돋움" panose="020B0600000101010101" pitchFamily="50" charset="-127"/>
+              </a:rPr>
+              <a:t>④</a:t>
+            </a:r>
+            <a:endParaRPr lang="ko-KR" altLang="en-US" dirty="0"/>
+          </a:p>
+        </p:txBody>
+      </p:sp>
+      <p:cxnSp>
+        <p:nvCxnSpPr>
+          <p:cNvPr id="13" name="직선 연결선 12">
+            <a:extLst>
+              <a:ext uri="{FF2B5EF4-FFF2-40B4-BE49-F238E27FC236}">
+                <a16:creationId xmlns:a16="http://schemas.microsoft.com/office/drawing/2014/main" id="{E8DA7698-B304-422B-8C01-C50F5126C6ED}"/>
+              </a:ext>
+            </a:extLst>
+          </p:cNvPr>
+          <p:cNvCxnSpPr>
+            <a:stCxn id="6" idx="2"/>
+            <a:endCxn id="4" idx="0"/>
+          </p:cNvCxnSpPr>
+          <p:nvPr/>
+        </p:nvCxnSpPr>
+        <p:spPr>
+          <a:xfrm>
+            <a:off x="1767605" y="3737617"/>
+            <a:ext cx="0" cy="582592"/>
+          </a:xfrm>
+          <a:prstGeom prst="line">
+            <a:avLst/>
+          </a:prstGeom>
+        </p:spPr>
+        <p:style>
+          <a:lnRef idx="1">
+            <a:schemeClr val="accent1"/>
+          </a:lnRef>
+          <a:fillRef idx="0">
+            <a:schemeClr val="accent1"/>
+          </a:fillRef>
+          <a:effectRef idx="0">
+            <a:schemeClr val="accent1"/>
+          </a:effectRef>
+          <a:fontRef idx="minor">
+            <a:schemeClr val="tx1"/>
+          </a:fontRef>
+        </p:style>
+      </p:cxnSp>
+      <p:cxnSp>
+        <p:nvCxnSpPr>
+          <p:cNvPr id="24" name="직선 화살표 연결선 23">
+            <a:extLst>
+              <a:ext uri="{FF2B5EF4-FFF2-40B4-BE49-F238E27FC236}">
+                <a16:creationId xmlns:a16="http://schemas.microsoft.com/office/drawing/2014/main" id="{92BCEA75-675B-4FF1-BEFF-09FE4A272D66}"/>
+              </a:ext>
+            </a:extLst>
+          </p:cNvPr>
+          <p:cNvCxnSpPr>
+            <a:stCxn id="4" idx="3"/>
+            <a:endCxn id="5" idx="1"/>
+          </p:cNvCxnSpPr>
+          <p:nvPr/>
+        </p:nvCxnSpPr>
+        <p:spPr>
+          <a:xfrm flipV="1">
+            <a:off x="2633873" y="5025603"/>
+            <a:ext cx="2072845" cy="3597"/>
+          </a:xfrm>
+          <a:prstGeom prst="straightConnector1">
+            <a:avLst/>
+          </a:prstGeom>
+          <a:ln>
+            <a:tailEnd type="triangle"/>
+          </a:ln>
+        </p:spPr>
+        <p:style>
+          <a:lnRef idx="1">
+            <a:schemeClr val="accent1"/>
+          </a:lnRef>
+          <a:fillRef idx="0">
+            <a:schemeClr val="accent1"/>
+          </a:fillRef>
+          <a:effectRef idx="0">
+            <a:schemeClr val="accent1"/>
+          </a:effectRef>
+          <a:fontRef idx="minor">
+            <a:schemeClr val="tx1"/>
+          </a:fontRef>
+        </p:style>
+      </p:cxnSp>
+      <p:sp>
+        <p:nvSpPr>
+          <p:cNvPr id="25" name="TextBox 24">
+            <a:extLst>
+              <a:ext uri="{FF2B5EF4-FFF2-40B4-BE49-F238E27FC236}">
+                <a16:creationId xmlns:a16="http://schemas.microsoft.com/office/drawing/2014/main" id="{2FE863F4-2E24-40A6-BD78-E9C513C876C9}"/>
+              </a:ext>
+            </a:extLst>
+          </p:cNvPr>
+          <p:cNvSpPr txBox="1"/>
+          <p:nvPr/>
+        </p:nvSpPr>
+        <p:spPr>
+          <a:xfrm>
+            <a:off x="2857237" y="5064847"/>
+            <a:ext cx="2610061" cy="369332"/>
+          </a:xfrm>
+          <a:prstGeom prst="rect">
+            <a:avLst/>
+          </a:prstGeom>
+          <a:noFill/>
+        </p:spPr>
+        <p:txBody>
+          <a:bodyPr wrap="square" rtlCol="0">
+            <a:spAutoFit/>
+          </a:bodyPr>
+          <a:lstStyle/>
+          <a:p>
+            <a:r>
+              <a:rPr lang="en-US" altLang="ko-KR" dirty="0">
+                <a:latin typeface="배달의민족 한나체 Pro" panose="020B0600000101010101" pitchFamily="50" charset="-127"/>
+                <a:ea typeface="배달의민족 한나체 Pro" panose="020B0600000101010101" pitchFamily="50" charset="-127"/>
+              </a:rPr>
+              <a:t>DMA Request</a:t>
+            </a:r>
+            <a:endParaRPr lang="ko-KR" altLang="en-US" dirty="0">
+              <a:latin typeface="배달의민족 한나체 Pro" panose="020B0600000101010101" pitchFamily="50" charset="-127"/>
+              <a:ea typeface="배달의민족 한나체 Pro" panose="020B0600000101010101" pitchFamily="50" charset="-127"/>
+            </a:endParaRPr>
+          </a:p>
+        </p:txBody>
+      </p:sp>
+      <p:cxnSp>
+        <p:nvCxnSpPr>
+          <p:cNvPr id="30" name="직선 화살표 연결선 29">
+            <a:extLst>
+              <a:ext uri="{FF2B5EF4-FFF2-40B4-BE49-F238E27FC236}">
+                <a16:creationId xmlns:a16="http://schemas.microsoft.com/office/drawing/2014/main" id="{7357B3EB-0A1A-4C0C-BCD9-F80B0D4F2B52}"/>
+              </a:ext>
+            </a:extLst>
+          </p:cNvPr>
+          <p:cNvCxnSpPr>
+            <a:stCxn id="6" idx="3"/>
+            <a:endCxn id="7" idx="1"/>
+          </p:cNvCxnSpPr>
+          <p:nvPr/>
+        </p:nvCxnSpPr>
+        <p:spPr>
+          <a:xfrm>
+            <a:off x="2633708" y="3323623"/>
+            <a:ext cx="4756546" cy="0"/>
+          </a:xfrm>
+          <a:prstGeom prst="straightConnector1">
+            <a:avLst/>
+          </a:prstGeom>
+          <a:ln>
+            <a:tailEnd type="triangle"/>
+          </a:ln>
+        </p:spPr>
+        <p:style>
+          <a:lnRef idx="1">
+            <a:schemeClr val="accent1"/>
+          </a:lnRef>
+          <a:fillRef idx="0">
+            <a:schemeClr val="accent1"/>
+          </a:fillRef>
+          <a:effectRef idx="0">
+            <a:schemeClr val="accent1"/>
+          </a:effectRef>
+          <a:fontRef idx="minor">
+            <a:schemeClr val="tx1"/>
+          </a:fontRef>
+        </p:style>
+      </p:cxnSp>
+      <p:cxnSp>
+        <p:nvCxnSpPr>
+          <p:cNvPr id="36" name="직선 화살표 연결선 35">
+            <a:extLst>
+              <a:ext uri="{FF2B5EF4-FFF2-40B4-BE49-F238E27FC236}">
+                <a16:creationId xmlns:a16="http://schemas.microsoft.com/office/drawing/2014/main" id="{EC9DA0CA-92E3-4297-B636-504E28AEE474}"/>
+              </a:ext>
+            </a:extLst>
+          </p:cNvPr>
+          <p:cNvCxnSpPr>
+            <a:stCxn id="7" idx="0"/>
+            <a:endCxn id="8" idx="2"/>
+          </p:cNvCxnSpPr>
+          <p:nvPr/>
+        </p:nvCxnSpPr>
+        <p:spPr>
+          <a:xfrm flipH="1" flipV="1">
+            <a:off x="8476931" y="1773479"/>
+            <a:ext cx="2" cy="841153"/>
+          </a:xfrm>
+          <a:prstGeom prst="straightConnector1">
+            <a:avLst/>
+          </a:prstGeom>
+          <a:ln>
+            <a:tailEnd type="triangle"/>
+          </a:ln>
+        </p:spPr>
+        <p:style>
+          <a:lnRef idx="1">
+            <a:schemeClr val="accent1"/>
+          </a:lnRef>
+          <a:fillRef idx="0">
+            <a:schemeClr val="accent1"/>
+          </a:fillRef>
+          <a:effectRef idx="0">
+            <a:schemeClr val="accent1"/>
+          </a:effectRef>
+          <a:fontRef idx="minor">
+            <a:schemeClr val="tx1"/>
+          </a:fontRef>
+        </p:style>
+      </p:cxnSp>
+      <p:sp>
+        <p:nvSpPr>
+          <p:cNvPr id="38" name="TextBox 37">
+            <a:extLst>
+              <a:ext uri="{FF2B5EF4-FFF2-40B4-BE49-F238E27FC236}">
+                <a16:creationId xmlns:a16="http://schemas.microsoft.com/office/drawing/2014/main" id="{FFC3E479-9896-46B5-A174-B611F7C155F5}"/>
+              </a:ext>
+            </a:extLst>
+          </p:cNvPr>
+          <p:cNvSpPr txBox="1"/>
+          <p:nvPr/>
+        </p:nvSpPr>
+        <p:spPr>
+          <a:xfrm>
+            <a:off x="4851870" y="2931960"/>
+            <a:ext cx="390087" cy="369332"/>
+          </a:xfrm>
+          <a:prstGeom prst="rect">
+            <a:avLst/>
+          </a:prstGeom>
+          <a:noFill/>
+        </p:spPr>
+        <p:txBody>
+          <a:bodyPr wrap="square" rtlCol="0">
+            <a:spAutoFit/>
+          </a:bodyPr>
+          <a:lstStyle/>
+          <a:p>
+            <a:r>
+              <a:rPr lang="en-US" altLang="ko-KR" dirty="0">
+                <a:solidFill>
+                  <a:schemeClr val="accent4">
+                    <a:lumMod val="50000"/>
+                  </a:schemeClr>
+                </a:solidFill>
+                <a:latin typeface="돋움" panose="020B0600000101010101" pitchFamily="50" charset="-127"/>
+                <a:ea typeface="돋움" panose="020B0600000101010101" pitchFamily="50" charset="-127"/>
+              </a:rPr>
+              <a:t>④</a:t>
+            </a:r>
+            <a:endParaRPr lang="ko-KR" altLang="en-US" dirty="0"/>
+          </a:p>
+        </p:txBody>
+      </p:sp>
+    </p:spTree>
+    <p:extLst>
+      <p:ext uri="{BB962C8B-B14F-4D97-AF65-F5344CB8AC3E}">
+        <p14:creationId xmlns:p14="http://schemas.microsoft.com/office/powerpoint/2010/main" val="2311379104"/>
+      </p:ext>
+    </p:extLst>
+  </p:cSld>
+  <p:clrMapOvr>
+    <a:masterClrMapping/>
+  </p:clrMapOvr>
+</p:sld>
+</file>
+
 <file path=ppt/theme/theme1.xml><?xml version="1.0" encoding="utf-8"?>
 <a:theme xmlns:a="http://schemas.openxmlformats.org/drawingml/2006/main" name="Office 테마">
   <a:themeElements>

</xml_diff>